<commit_message>
project setup for training images
</commit_message>
<xml_diff>
--- a/iteration2Phase/Iteration 2.pptx
+++ b/iteration2Phase/Iteration 2.pptx
@@ -1,6 +1,6 @@
 
 <file path=ppt/presentation.xml><?xml version="1.0" encoding="utf-8"?>
-<p:presentation xmlns:a="http://schemas.openxmlformats.org/drawingml/2006/main" xmlns:r="http://schemas.openxmlformats.org/officeDocument/2006/relationships" xmlns:p="http://schemas.openxmlformats.org/presentationml/2006/main" showSpecialPlsOnTitleSld="0" strictFirstAndLastChars="0" embedTrueTypeFonts="1" saveSubsetFonts="1" autoCompressPictures="0">
+<p:presentation xmlns:a="http://schemas.openxmlformats.org/drawingml/2006/main" xmlns:r="http://schemas.openxmlformats.org/officeDocument/2006/relationships" xmlns:p="http://schemas.openxmlformats.org/presentationml/2006/main" showSpecialPlsOnTitleSld="0" strictFirstAndLastChars="0" embedTrueTypeFonts="1" autoCompressPictures="0">
   <p:sldMasterIdLst>
     <p:sldMasterId id="2147483659" r:id="rId1"/>
   </p:sldMasterIdLst>
@@ -24,14 +24,14 @@
   <p:notesSz cx="6858000" cy="9144000"/>
   <p:embeddedFontLst>
     <p:embeddedFont>
-      <p:font typeface="Lato" panose="020B0604020202020204" charset="0"/>
+      <p:font typeface="Lato" panose="020F0502020204030203" pitchFamily="34" charset="77"/>
       <p:regular r:id="rId14"/>
       <p:bold r:id="rId15"/>
       <p:italic r:id="rId16"/>
       <p:boldItalic r:id="rId17"/>
     </p:embeddedFont>
     <p:embeddedFont>
-      <p:font typeface="Montserrat" panose="020B0604020202020204" charset="0"/>
+      <p:font typeface="Montserrat" pitchFamily="2" charset="77"/>
       <p:regular r:id="rId18"/>
       <p:bold r:id="rId19"/>
       <p:italic r:id="rId20"/>
@@ -10563,15 +10563,15 @@
               <a:buNone/>
             </a:pPr>
             <a:r>
-              <a:rPr lang="en" sz="1800">
+              <a:rPr lang="en" sz="1800" dirty="0">
                 <a:latin typeface="Montserrat"/>
                 <a:ea typeface="Montserrat"/>
                 <a:cs typeface="Montserrat"/>
                 <a:sym typeface="Montserrat"/>
               </a:rPr>
-              <a:t>We are creating a multi-platform mobile app which focuses on image recognition capabilities in an educational environment. </a:t>
+              <a:t>We are creating a mobile app which focuses on image recognition capabilities in an educational environment. </a:t>
             </a:r>
-            <a:endParaRPr sz="1800">
+            <a:endParaRPr sz="1800" dirty="0">
               <a:latin typeface="Montserrat"/>
               <a:ea typeface="Montserrat"/>
               <a:cs typeface="Montserrat"/>

</xml_diff>